<commit_message>
file name change for gdx4png and large file location changes.
</commit_message>
<xml_diff>
--- a/doc/ManualFigure.pptx
+++ b/doc/ManualFigure.pptx
@@ -117,12 +117,12 @@
   <pc:docChgLst>
     <pc:chgData name="Fujimori Shinichiro" userId="51cf36da-7584-4fda-93b3-a373da257411" providerId="ADAL" clId="{C89191B6-A373-4F94-9629-B3B78B292DD6}"/>
     <pc:docChg chg="undo custSel delSld modSld">
-      <pc:chgData name="Fujimori Shinichiro" userId="51cf36da-7584-4fda-93b3-a373da257411" providerId="ADAL" clId="{C89191B6-A373-4F94-9629-B3B78B292DD6}" dt="2021-10-15T07:32:22.439" v="55" actId="20577"/>
+      <pc:chgData name="Fujimori Shinichiro" userId="51cf36da-7584-4fda-93b3-a373da257411" providerId="ADAL" clId="{C89191B6-A373-4F94-9629-B3B78B292DD6}" dt="2021-10-19T04:05:04.095" v="67" actId="20577"/>
       <pc:docMkLst>
         <pc:docMk/>
       </pc:docMkLst>
       <pc:sldChg chg="modSp mod">
-        <pc:chgData name="Fujimori Shinichiro" userId="51cf36da-7584-4fda-93b3-a373da257411" providerId="ADAL" clId="{C89191B6-A373-4F94-9629-B3B78B292DD6}" dt="2021-10-15T07:32:22.439" v="55" actId="20577"/>
+        <pc:chgData name="Fujimori Shinichiro" userId="51cf36da-7584-4fda-93b3-a373da257411" providerId="ADAL" clId="{C89191B6-A373-4F94-9629-B3B78B292DD6}" dt="2021-10-19T04:05:04.095" v="67" actId="20577"/>
         <pc:sldMkLst>
           <pc:docMk/>
           <pc:sldMk cId="2179355969" sldId="256"/>
@@ -216,6 +216,14 @@
           </ac:spMkLst>
         </pc:spChg>
         <pc:spChg chg="mod">
+          <ac:chgData name="Fujimori Shinichiro" userId="51cf36da-7584-4fda-93b3-a373da257411" providerId="ADAL" clId="{C89191B6-A373-4F94-9629-B3B78B292DD6}" dt="2021-10-19T04:05:04.095" v="67" actId="20577"/>
+          <ac:spMkLst>
+            <pc:docMk/>
+            <pc:sldMk cId="2179355969" sldId="256"/>
+            <ac:spMk id="42" creationId="{3AFC2DF3-85B7-4CF0-9BDF-73EBD98EEEF6}"/>
+          </ac:spMkLst>
+        </pc:spChg>
+        <pc:spChg chg="mod">
           <ac:chgData name="Fujimori Shinichiro" userId="51cf36da-7584-4fda-93b3-a373da257411" providerId="ADAL" clId="{C89191B6-A373-4F94-9629-B3B78B292DD6}" dt="2021-10-15T07:32:22.439" v="55" actId="20577"/>
           <ac:spMkLst>
             <pc:docMk/>
@@ -393,7 +401,7 @@
           <a:p>
             <a:fld id="{4692DEA3-DF2E-4FAD-8E5B-F1026A9FC3AF}" type="datetimeFigureOut">
               <a:rPr kumimoji="1" lang="ja-JP" altLang="en-US" smtClean="0"/>
-              <a:t>2021/10/15</a:t>
+              <a:t>2021/10/19</a:t>
             </a:fld>
             <a:endParaRPr kumimoji="1" lang="ja-JP" altLang="en-US"/>
           </a:p>
@@ -593,7 +601,7 @@
           <a:p>
             <a:fld id="{4692DEA3-DF2E-4FAD-8E5B-F1026A9FC3AF}" type="datetimeFigureOut">
               <a:rPr kumimoji="1" lang="ja-JP" altLang="en-US" smtClean="0"/>
-              <a:t>2021/10/15</a:t>
+              <a:t>2021/10/19</a:t>
             </a:fld>
             <a:endParaRPr kumimoji="1" lang="ja-JP" altLang="en-US"/>
           </a:p>
@@ -803,7 +811,7 @@
           <a:p>
             <a:fld id="{4692DEA3-DF2E-4FAD-8E5B-F1026A9FC3AF}" type="datetimeFigureOut">
               <a:rPr kumimoji="1" lang="ja-JP" altLang="en-US" smtClean="0"/>
-              <a:t>2021/10/15</a:t>
+              <a:t>2021/10/19</a:t>
             </a:fld>
             <a:endParaRPr kumimoji="1" lang="ja-JP" altLang="en-US"/>
           </a:p>
@@ -1003,7 +1011,7 @@
           <a:p>
             <a:fld id="{4692DEA3-DF2E-4FAD-8E5B-F1026A9FC3AF}" type="datetimeFigureOut">
               <a:rPr kumimoji="1" lang="ja-JP" altLang="en-US" smtClean="0"/>
-              <a:t>2021/10/15</a:t>
+              <a:t>2021/10/19</a:t>
             </a:fld>
             <a:endParaRPr kumimoji="1" lang="ja-JP" altLang="en-US"/>
           </a:p>
@@ -1279,7 +1287,7 @@
           <a:p>
             <a:fld id="{4692DEA3-DF2E-4FAD-8E5B-F1026A9FC3AF}" type="datetimeFigureOut">
               <a:rPr kumimoji="1" lang="ja-JP" altLang="en-US" smtClean="0"/>
-              <a:t>2021/10/15</a:t>
+              <a:t>2021/10/19</a:t>
             </a:fld>
             <a:endParaRPr kumimoji="1" lang="ja-JP" altLang="en-US"/>
           </a:p>
@@ -1547,7 +1555,7 @@
           <a:p>
             <a:fld id="{4692DEA3-DF2E-4FAD-8E5B-F1026A9FC3AF}" type="datetimeFigureOut">
               <a:rPr kumimoji="1" lang="ja-JP" altLang="en-US" smtClean="0"/>
-              <a:t>2021/10/15</a:t>
+              <a:t>2021/10/19</a:t>
             </a:fld>
             <a:endParaRPr kumimoji="1" lang="ja-JP" altLang="en-US"/>
           </a:p>
@@ -1962,7 +1970,7 @@
           <a:p>
             <a:fld id="{4692DEA3-DF2E-4FAD-8E5B-F1026A9FC3AF}" type="datetimeFigureOut">
               <a:rPr kumimoji="1" lang="ja-JP" altLang="en-US" smtClean="0"/>
-              <a:t>2021/10/15</a:t>
+              <a:t>2021/10/19</a:t>
             </a:fld>
             <a:endParaRPr kumimoji="1" lang="ja-JP" altLang="en-US"/>
           </a:p>
@@ -2104,7 +2112,7 @@
           <a:p>
             <a:fld id="{4692DEA3-DF2E-4FAD-8E5B-F1026A9FC3AF}" type="datetimeFigureOut">
               <a:rPr kumimoji="1" lang="ja-JP" altLang="en-US" smtClean="0"/>
-              <a:t>2021/10/15</a:t>
+              <a:t>2021/10/19</a:t>
             </a:fld>
             <a:endParaRPr kumimoji="1" lang="ja-JP" altLang="en-US"/>
           </a:p>
@@ -2217,7 +2225,7 @@
           <a:p>
             <a:fld id="{4692DEA3-DF2E-4FAD-8E5B-F1026A9FC3AF}" type="datetimeFigureOut">
               <a:rPr kumimoji="1" lang="ja-JP" altLang="en-US" smtClean="0"/>
-              <a:t>2021/10/15</a:t>
+              <a:t>2021/10/19</a:t>
             </a:fld>
             <a:endParaRPr kumimoji="1" lang="ja-JP" altLang="en-US"/>
           </a:p>
@@ -2530,7 +2538,7 @@
           <a:p>
             <a:fld id="{4692DEA3-DF2E-4FAD-8E5B-F1026A9FC3AF}" type="datetimeFigureOut">
               <a:rPr kumimoji="1" lang="ja-JP" altLang="en-US" smtClean="0"/>
-              <a:t>2021/10/15</a:t>
+              <a:t>2021/10/19</a:t>
             </a:fld>
             <a:endParaRPr kumimoji="1" lang="ja-JP" altLang="en-US"/>
           </a:p>
@@ -2819,7 +2827,7 @@
           <a:p>
             <a:fld id="{4692DEA3-DF2E-4FAD-8E5B-F1026A9FC3AF}" type="datetimeFigureOut">
               <a:rPr kumimoji="1" lang="ja-JP" altLang="en-US" smtClean="0"/>
-              <a:t>2021/10/15</a:t>
+              <a:t>2021/10/19</a:t>
             </a:fld>
             <a:endParaRPr kumimoji="1" lang="ja-JP" altLang="en-US"/>
           </a:p>
@@ -3062,7 +3070,7 @@
           <a:p>
             <a:fld id="{4692DEA3-DF2E-4FAD-8E5B-F1026A9FC3AF}" type="datetimeFigureOut">
               <a:rPr kumimoji="1" lang="ja-JP" altLang="en-US" smtClean="0"/>
-              <a:t>2021/10/15</a:t>
+              <a:t>2021/10/19</a:t>
             </a:fld>
             <a:endParaRPr kumimoji="1" lang="ja-JP" altLang="en-US"/>
           </a:p>
@@ -4651,7 +4659,7 @@
           <a:p>
             <a:r>
               <a:rPr kumimoji="1" lang="en-US" altLang="ja-JP" sz="1200" dirty="0"/>
-              <a:t>\prog\gdx2txt.gms</a:t>
+              <a:t>\prog\gdx4png.gms</a:t>
             </a:r>
             <a:endParaRPr kumimoji="1" lang="ja-JP" altLang="en-US" sz="1200" dirty="0"/>
           </a:p>

</xml_diff>